<commit_message>
Added smoker/region to code and powerpoint
</commit_message>
<xml_diff>
--- a/Medical Cost After Insurance.pptx
+++ b/Medical Cost After Insurance.pptx
@@ -12,6 +12,7 @@
     <p:sldId id="260" r:id="rId6"/>
     <p:sldId id="259" r:id="rId7"/>
     <p:sldId id="262" r:id="rId8"/>
+    <p:sldId id="263" r:id="rId9"/>
   </p:sldIdLst>
   <p:sldSz cx="12192000" cy="6858000"/>
   <p:notesSz cx="6858000" cy="9144000"/>
@@ -110,6 +111,11 @@
       </a:defRPr>
     </a:lvl9pPr>
   </p:defaultTextStyle>
+  <p:extLst>
+    <p:ext uri="{EFAFB233-063F-42B5-8137-9DF3F51BA10A}">
+      <p15:sldGuideLst xmlns:p15="http://schemas.microsoft.com/office/powerpoint/2012/main"/>
+    </p:ext>
+  </p:extLst>
 </p:presentation>
 </file>
 
@@ -4319,7 +4325,7 @@
           <a:p>
             <a:fld id="{8C1E1FAD-7351-4908-963A-08EA8E4AB7A0}" type="datetimeFigureOut">
               <a:rPr lang="en-US" smtClean="0"/>
-              <a:t>11/14/2023</a:t>
+              <a:t>11/20/2023</a:t>
             </a:fld>
             <a:endParaRPr lang="en-US"/>
           </a:p>
@@ -4517,7 +4523,7 @@
           <a:p>
             <a:fld id="{8C1E1FAD-7351-4908-963A-08EA8E4AB7A0}" type="datetimeFigureOut">
               <a:rPr lang="en-US" smtClean="0"/>
-              <a:t>11/14/2023</a:t>
+              <a:t>11/20/2023</a:t>
             </a:fld>
             <a:endParaRPr lang="en-US"/>
           </a:p>
@@ -4725,7 +4731,7 @@
           <a:p>
             <a:fld id="{8C1E1FAD-7351-4908-963A-08EA8E4AB7A0}" type="datetimeFigureOut">
               <a:rPr lang="en-US" smtClean="0"/>
-              <a:t>11/14/2023</a:t>
+              <a:t>11/20/2023</a:t>
             </a:fld>
             <a:endParaRPr lang="en-US"/>
           </a:p>
@@ -4954,7 +4960,7 @@
           <a:p>
             <a:fld id="{8C1E1FAD-7351-4908-963A-08EA8E4AB7A0}" type="datetimeFigureOut">
               <a:rPr lang="en-US" smtClean="0"/>
-              <a:t>11/14/2023</a:t>
+              <a:t>11/20/2023</a:t>
             </a:fld>
             <a:endParaRPr lang="en-US"/>
           </a:p>
@@ -5231,7 +5237,7 @@
           <a:p>
             <a:fld id="{8C1E1FAD-7351-4908-963A-08EA8E4AB7A0}" type="datetimeFigureOut">
               <a:rPr lang="en-US" smtClean="0"/>
-              <a:t>11/14/2023</a:t>
+              <a:t>11/20/2023</a:t>
             </a:fld>
             <a:endParaRPr lang="en-US"/>
           </a:p>
@@ -5496,7 +5502,7 @@
           <a:p>
             <a:fld id="{8C1E1FAD-7351-4908-963A-08EA8E4AB7A0}" type="datetimeFigureOut">
               <a:rPr lang="en-US" smtClean="0"/>
-              <a:t>11/14/2023</a:t>
+              <a:t>11/20/2023</a:t>
             </a:fld>
             <a:endParaRPr lang="en-US"/>
           </a:p>
@@ -5912,7 +5918,7 @@
           <a:p>
             <a:fld id="{8C1E1FAD-7351-4908-963A-08EA8E4AB7A0}" type="datetimeFigureOut">
               <a:rPr lang="en-US" smtClean="0"/>
-              <a:t>11/14/2023</a:t>
+              <a:t>11/20/2023</a:t>
             </a:fld>
             <a:endParaRPr lang="en-US"/>
           </a:p>
@@ -6058,7 +6064,7 @@
           <a:p>
             <a:fld id="{8C1E1FAD-7351-4908-963A-08EA8E4AB7A0}" type="datetimeFigureOut">
               <a:rPr lang="en-US" smtClean="0"/>
-              <a:t>11/14/2023</a:t>
+              <a:t>11/20/2023</a:t>
             </a:fld>
             <a:endParaRPr lang="en-US"/>
           </a:p>
@@ -6171,7 +6177,7 @@
           <a:p>
             <a:fld id="{8C1E1FAD-7351-4908-963A-08EA8E4AB7A0}" type="datetimeFigureOut">
               <a:rPr lang="en-US" smtClean="0"/>
-              <a:t>11/14/2023</a:t>
+              <a:t>11/20/2023</a:t>
             </a:fld>
             <a:endParaRPr lang="en-US"/>
           </a:p>
@@ -6486,7 +6492,7 @@
           <a:p>
             <a:fld id="{8C1E1FAD-7351-4908-963A-08EA8E4AB7A0}" type="datetimeFigureOut">
               <a:rPr lang="en-US" smtClean="0"/>
-              <a:t>11/14/2023</a:t>
+              <a:t>11/20/2023</a:t>
             </a:fld>
             <a:endParaRPr lang="en-US"/>
           </a:p>
@@ -6779,7 +6785,7 @@
           <a:p>
             <a:fld id="{8C1E1FAD-7351-4908-963A-08EA8E4AB7A0}" type="datetimeFigureOut">
               <a:rPr lang="en-US" smtClean="0"/>
-              <a:t>11/14/2023</a:t>
+              <a:t>11/20/2023</a:t>
             </a:fld>
             <a:endParaRPr lang="en-US"/>
           </a:p>
@@ -7018,7 +7024,7 @@
           <a:p>
             <a:fld id="{8C1E1FAD-7351-4908-963A-08EA8E4AB7A0}" type="datetimeFigureOut">
               <a:rPr lang="en-US" smtClean="0"/>
-              <a:t>11/14/2023</a:t>
+              <a:t>11/20/2023</a:t>
             </a:fld>
             <a:endParaRPr lang="en-US"/>
           </a:p>
@@ -9147,10 +9153,281 @@
           </a:p>
         </p:txBody>
       </p:sp>
+      <p:pic>
+        <p:nvPicPr>
+          <p:cNvPr id="4" name="Picture 2">
+            <a:extLst>
+              <a:ext uri="{FF2B5EF4-FFF2-40B4-BE49-F238E27FC236}">
+                <a16:creationId xmlns:a16="http://schemas.microsoft.com/office/drawing/2014/main" id="{2735FBE1-7123-4C15-EB5E-061BE0E57B9A}"/>
+              </a:ext>
+            </a:extLst>
+          </p:cNvPr>
+          <p:cNvPicPr>
+            <a:picLocks noChangeAspect="1" noChangeArrowheads="1"/>
+          </p:cNvPicPr>
+          <p:nvPr/>
+        </p:nvPicPr>
+        <p:blipFill>
+          <a:blip r:embed="rId2">
+            <a:extLst>
+              <a:ext uri="{28A0092B-C50C-407E-A947-70E740481C1C}">
+                <a14:useLocalDpi xmlns:a14="http://schemas.microsoft.com/office/drawing/2010/main" val="0"/>
+              </a:ext>
+            </a:extLst>
+          </a:blip>
+          <a:srcRect/>
+          <a:stretch>
+            <a:fillRect/>
+          </a:stretch>
+        </p:blipFill>
+        <p:spPr bwMode="auto">
+          <a:xfrm>
+            <a:off x="1519527" y="2346742"/>
+            <a:ext cx="3557023" cy="3739903"/>
+          </a:xfrm>
+          <a:prstGeom prst="rect">
+            <a:avLst/>
+          </a:prstGeom>
+          <a:noFill/>
+          <a:extLst>
+            <a:ext uri="{909E8E84-426E-40DD-AFC4-6F175D3DCCD1}">
+              <a14:hiddenFill xmlns:a14="http://schemas.microsoft.com/office/drawing/2010/main">
+                <a:solidFill>
+                  <a:srgbClr val="FFFFFF"/>
+                </a:solidFill>
+              </a14:hiddenFill>
+            </a:ext>
+          </a:extLst>
+        </p:spPr>
+      </p:pic>
+      <p:pic>
+        <p:nvPicPr>
+          <p:cNvPr id="5" name="Picture 4">
+            <a:extLst>
+              <a:ext uri="{FF2B5EF4-FFF2-40B4-BE49-F238E27FC236}">
+                <a16:creationId xmlns:a16="http://schemas.microsoft.com/office/drawing/2014/main" id="{7B354444-1B94-E4DA-93AF-956D65C73421}"/>
+              </a:ext>
+            </a:extLst>
+          </p:cNvPr>
+          <p:cNvPicPr>
+            <a:picLocks noChangeAspect="1" noChangeArrowheads="1"/>
+          </p:cNvPicPr>
+          <p:nvPr/>
+        </p:nvPicPr>
+        <p:blipFill>
+          <a:blip r:embed="rId3">
+            <a:extLst>
+              <a:ext uri="{28A0092B-C50C-407E-A947-70E740481C1C}">
+                <a14:useLocalDpi xmlns:a14="http://schemas.microsoft.com/office/drawing/2010/main" val="0"/>
+              </a:ext>
+            </a:extLst>
+          </a:blip>
+          <a:srcRect/>
+          <a:stretch>
+            <a:fillRect/>
+          </a:stretch>
+        </p:blipFill>
+        <p:spPr bwMode="auto">
+          <a:xfrm>
+            <a:off x="5429552" y="2346742"/>
+            <a:ext cx="4911651" cy="3777552"/>
+          </a:xfrm>
+          <a:prstGeom prst="rect">
+            <a:avLst/>
+          </a:prstGeom>
+          <a:noFill/>
+          <a:extLst>
+            <a:ext uri="{909E8E84-426E-40DD-AFC4-6F175D3DCCD1}">
+              <a14:hiddenFill xmlns:a14="http://schemas.microsoft.com/office/drawing/2010/main">
+                <a:solidFill>
+                  <a:srgbClr val="FFFFFF"/>
+                </a:solidFill>
+              </a14:hiddenFill>
+            </a:ext>
+          </a:extLst>
+        </p:spPr>
+      </p:pic>
     </p:spTree>
     <p:extLst>
       <p:ext uri="{BB962C8B-B14F-4D97-AF65-F5344CB8AC3E}">
         <p14:creationId xmlns:p14="http://schemas.microsoft.com/office/powerpoint/2010/main" val="3521787242"/>
+      </p:ext>
+    </p:extLst>
+  </p:cSld>
+  <p:clrMapOvr>
+    <a:masterClrMapping/>
+  </p:clrMapOvr>
+</p:sld>
+</file>
+
+<file path=ppt/slides/slide8.xml><?xml version="1.0" encoding="utf-8"?>
+<p:sld xmlns:a="http://schemas.openxmlformats.org/drawingml/2006/main" xmlns:r="http://schemas.openxmlformats.org/officeDocument/2006/relationships" xmlns:p="http://schemas.openxmlformats.org/presentationml/2006/main">
+  <p:cSld>
+    <p:spTree>
+      <p:nvGrpSpPr>
+        <p:cNvPr id="1" name=""/>
+        <p:cNvGrpSpPr/>
+        <p:nvPr/>
+      </p:nvGrpSpPr>
+      <p:grpSpPr>
+        <a:xfrm>
+          <a:off x="0" y="0"/>
+          <a:ext cx="0" cy="0"/>
+          <a:chOff x="0" y="0"/>
+          <a:chExt cx="0" cy="0"/>
+        </a:xfrm>
+      </p:grpSpPr>
+      <p:sp>
+        <p:nvSpPr>
+          <p:cNvPr id="2" name="Title 1">
+            <a:extLst>
+              <a:ext uri="{FF2B5EF4-FFF2-40B4-BE49-F238E27FC236}">
+                <a16:creationId xmlns:a16="http://schemas.microsoft.com/office/drawing/2014/main" id="{59944721-1DAD-6B1C-A8B4-B6B4A1488726}"/>
+              </a:ext>
+            </a:extLst>
+          </p:cNvPr>
+          <p:cNvSpPr>
+            <a:spLocks noGrp="1"/>
+          </p:cNvSpPr>
+          <p:nvPr>
+            <p:ph type="title"/>
+          </p:nvPr>
+        </p:nvSpPr>
+        <p:spPr/>
+        <p:txBody>
+          <a:bodyPr/>
+          <a:lstStyle/>
+          <a:p>
+            <a:r>
+              <a:rPr lang="en-US" dirty="0"/>
+              <a:t>How does region and be a (non)smoker affect medical cost?</a:t>
+            </a:r>
+          </a:p>
+        </p:txBody>
+      </p:sp>
+      <p:sp>
+        <p:nvSpPr>
+          <p:cNvPr id="3" name="Content Placeholder 2">
+            <a:extLst>
+              <a:ext uri="{FF2B5EF4-FFF2-40B4-BE49-F238E27FC236}">
+                <a16:creationId xmlns:a16="http://schemas.microsoft.com/office/drawing/2014/main" id="{DCEE3AD7-CA57-6A49-CA8D-D7B2DA05A602}"/>
+              </a:ext>
+            </a:extLst>
+          </p:cNvPr>
+          <p:cNvSpPr>
+            <a:spLocks noGrp="1"/>
+          </p:cNvSpPr>
+          <p:nvPr>
+            <p:ph idx="1"/>
+          </p:nvPr>
+        </p:nvSpPr>
+        <p:spPr/>
+        <p:txBody>
+          <a:bodyPr/>
+          <a:lstStyle/>
+          <a:p>
+            <a:endParaRPr lang="en-US"/>
+          </a:p>
+        </p:txBody>
+      </p:sp>
+      <p:pic>
+        <p:nvPicPr>
+          <p:cNvPr id="4" name="Picture 2">
+            <a:extLst>
+              <a:ext uri="{FF2B5EF4-FFF2-40B4-BE49-F238E27FC236}">
+                <a16:creationId xmlns:a16="http://schemas.microsoft.com/office/drawing/2014/main" id="{88B7924A-6E61-68CC-51F9-2419BBA712FD}"/>
+              </a:ext>
+            </a:extLst>
+          </p:cNvPr>
+          <p:cNvPicPr>
+            <a:picLocks noChangeAspect="1" noChangeArrowheads="1"/>
+          </p:cNvPicPr>
+          <p:nvPr/>
+        </p:nvPicPr>
+        <p:blipFill>
+          <a:blip r:embed="rId2">
+            <a:extLst>
+              <a:ext uri="{28A0092B-C50C-407E-A947-70E740481C1C}">
+                <a14:useLocalDpi xmlns:a14="http://schemas.microsoft.com/office/drawing/2010/main" val="0"/>
+              </a:ext>
+            </a:extLst>
+          </a:blip>
+          <a:srcRect/>
+          <a:stretch>
+            <a:fillRect/>
+          </a:stretch>
+        </p:blipFill>
+        <p:spPr bwMode="auto">
+          <a:xfrm>
+            <a:off x="1416183" y="2251762"/>
+            <a:ext cx="4549641" cy="3854450"/>
+          </a:xfrm>
+          <a:prstGeom prst="rect">
+            <a:avLst/>
+          </a:prstGeom>
+          <a:noFill/>
+          <a:extLst>
+            <a:ext uri="{909E8E84-426E-40DD-AFC4-6F175D3DCCD1}">
+              <a14:hiddenFill xmlns:a14="http://schemas.microsoft.com/office/drawing/2010/main">
+                <a:solidFill>
+                  <a:srgbClr val="FFFFFF"/>
+                </a:solidFill>
+              </a14:hiddenFill>
+            </a:ext>
+          </a:extLst>
+        </p:spPr>
+      </p:pic>
+      <p:pic>
+        <p:nvPicPr>
+          <p:cNvPr id="5" name="Picture 4">
+            <a:extLst>
+              <a:ext uri="{FF2B5EF4-FFF2-40B4-BE49-F238E27FC236}">
+                <a16:creationId xmlns:a16="http://schemas.microsoft.com/office/drawing/2014/main" id="{189837DE-4E2E-40DF-3AA5-80AC7F6535F2}"/>
+              </a:ext>
+            </a:extLst>
+          </p:cNvPr>
+          <p:cNvPicPr>
+            <a:picLocks noChangeAspect="1" noChangeArrowheads="1"/>
+          </p:cNvPicPr>
+          <p:nvPr/>
+        </p:nvPicPr>
+        <p:blipFill>
+          <a:blip r:embed="rId3">
+            <a:extLst>
+              <a:ext uri="{28A0092B-C50C-407E-A947-70E740481C1C}">
+                <a14:useLocalDpi xmlns:a14="http://schemas.microsoft.com/office/drawing/2010/main" val="0"/>
+              </a:ext>
+            </a:extLst>
+          </a:blip>
+          <a:srcRect/>
+          <a:stretch>
+            <a:fillRect/>
+          </a:stretch>
+        </p:blipFill>
+        <p:spPr bwMode="auto">
+          <a:xfrm>
+            <a:off x="6458295" y="2251762"/>
+            <a:ext cx="4317522" cy="3855716"/>
+          </a:xfrm>
+          <a:prstGeom prst="rect">
+            <a:avLst/>
+          </a:prstGeom>
+          <a:noFill/>
+          <a:extLst>
+            <a:ext uri="{909E8E84-426E-40DD-AFC4-6F175D3DCCD1}">
+              <a14:hiddenFill xmlns:a14="http://schemas.microsoft.com/office/drawing/2010/main">
+                <a:solidFill>
+                  <a:srgbClr val="FFFFFF"/>
+                </a:solidFill>
+              </a14:hiddenFill>
+            </a:ext>
+          </a:extLst>
+        </p:spPr>
+      </p:pic>
+    </p:spTree>
+    <p:extLst>
+      <p:ext uri="{BB962C8B-B14F-4D97-AF65-F5344CB8AC3E}">
+        <p14:creationId xmlns:p14="http://schemas.microsoft.com/office/powerpoint/2010/main" val="4012662218"/>
       </p:ext>
     </p:extLst>
   </p:cSld>

</xml_diff>

<commit_message>
Added BMI and Age Sex Slides
</commit_message>
<xml_diff>
--- a/Medical Cost After Insurance.pptx
+++ b/Medical Cost After Insurance.pptx
@@ -8,12 +8,15 @@
     <p:sldId id="256" r:id="rId2"/>
     <p:sldId id="257" r:id="rId3"/>
     <p:sldId id="258" r:id="rId4"/>
-    <p:sldId id="261" r:id="rId5"/>
-    <p:sldId id="260" r:id="rId6"/>
-    <p:sldId id="264" r:id="rId7"/>
-    <p:sldId id="266" r:id="rId8"/>
-    <p:sldId id="262" r:id="rId9"/>
-    <p:sldId id="263" r:id="rId10"/>
+    <p:sldId id="267" r:id="rId5"/>
+    <p:sldId id="268" r:id="rId6"/>
+    <p:sldId id="265" r:id="rId7"/>
+    <p:sldId id="269" r:id="rId8"/>
+    <p:sldId id="270" r:id="rId9"/>
+    <p:sldId id="264" r:id="rId10"/>
+    <p:sldId id="266" r:id="rId11"/>
+    <p:sldId id="262" r:id="rId12"/>
+    <p:sldId id="263" r:id="rId13"/>
   </p:sldIdLst>
   <p:sldSz cx="12192000" cy="6858000"/>
   <p:notesSz cx="6858000" cy="9144000"/>
@@ -8350,6 +8353,527 @@
 </p:sld>
 </file>
 
+<file path=ppt/slides/slide10.xml><?xml version="1.0" encoding="utf-8"?>
+<p:sld xmlns:a="http://schemas.openxmlformats.org/drawingml/2006/main" xmlns:r="http://schemas.openxmlformats.org/officeDocument/2006/relationships" xmlns:p="http://schemas.openxmlformats.org/presentationml/2006/main">
+  <p:cSld>
+    <p:spTree>
+      <p:nvGrpSpPr>
+        <p:cNvPr id="1" name=""/>
+        <p:cNvGrpSpPr/>
+        <p:nvPr/>
+      </p:nvGrpSpPr>
+      <p:grpSpPr>
+        <a:xfrm>
+          <a:off x="0" y="0"/>
+          <a:ext cx="0" cy="0"/>
+          <a:chOff x="0" y="0"/>
+          <a:chExt cx="0" cy="0"/>
+        </a:xfrm>
+      </p:grpSpPr>
+      <p:pic>
+        <p:nvPicPr>
+          <p:cNvPr id="4" name="Content Placeholder 3">
+            <a:extLst>
+              <a:ext uri="{FF2B5EF4-FFF2-40B4-BE49-F238E27FC236}">
+                <a16:creationId xmlns:a16="http://schemas.microsoft.com/office/drawing/2014/main" id="{C22740F8-3FB5-3267-1679-9CA11BDC971E}"/>
+              </a:ext>
+            </a:extLst>
+          </p:cNvPr>
+          <p:cNvPicPr>
+            <a:picLocks noGrp="1" noChangeAspect="1"/>
+          </p:cNvPicPr>
+          <p:nvPr>
+            <p:ph idx="1"/>
+          </p:nvPr>
+        </p:nvPicPr>
+        <p:blipFill>
+          <a:blip r:embed="rId2"/>
+          <a:stretch>
+            <a:fillRect/>
+          </a:stretch>
+        </p:blipFill>
+        <p:spPr>
+          <a:xfrm>
+            <a:off x="4527022" y="1007042"/>
+            <a:ext cx="7089163" cy="4843915"/>
+          </a:xfrm>
+          <a:prstGeom prst="rect">
+            <a:avLst/>
+          </a:prstGeom>
+        </p:spPr>
+      </p:pic>
+      <p:sp>
+        <p:nvSpPr>
+          <p:cNvPr id="5" name="TextBox 4">
+            <a:extLst>
+              <a:ext uri="{FF2B5EF4-FFF2-40B4-BE49-F238E27FC236}">
+                <a16:creationId xmlns:a16="http://schemas.microsoft.com/office/drawing/2014/main" id="{B3675EEF-1D51-0B81-44A1-5716908A4A0C}"/>
+              </a:ext>
+            </a:extLst>
+          </p:cNvPr>
+          <p:cNvSpPr txBox="1"/>
+          <p:nvPr/>
+        </p:nvSpPr>
+        <p:spPr>
+          <a:xfrm>
+            <a:off x="575815" y="1007042"/>
+            <a:ext cx="3601549" cy="1323439"/>
+          </a:xfrm>
+          <a:prstGeom prst="rect">
+            <a:avLst/>
+          </a:prstGeom>
+          <a:noFill/>
+        </p:spPr>
+        <p:txBody>
+          <a:bodyPr wrap="square" rtlCol="0">
+            <a:spAutoFit/>
+          </a:bodyPr>
+          <a:lstStyle/>
+          <a:p>
+            <a:r>
+              <a:rPr lang="en-US" sz="1600" dirty="0"/>
+              <a:t>Here we have a scatterplot that shows a trend that looks like people with no children tend to have bigger medical charges. </a:t>
+            </a:r>
+          </a:p>
+        </p:txBody>
+      </p:sp>
+      <p:sp>
+        <p:nvSpPr>
+          <p:cNvPr id="6" name="TextBox 5">
+            <a:extLst>
+              <a:ext uri="{FF2B5EF4-FFF2-40B4-BE49-F238E27FC236}">
+                <a16:creationId xmlns:a16="http://schemas.microsoft.com/office/drawing/2014/main" id="{DD36C097-4FFF-587D-7AD9-F42A0EE334F6}"/>
+              </a:ext>
+            </a:extLst>
+          </p:cNvPr>
+          <p:cNvSpPr txBox="1"/>
+          <p:nvPr/>
+        </p:nvSpPr>
+        <p:spPr>
+          <a:xfrm>
+            <a:off x="575815" y="2878860"/>
+            <a:ext cx="3282215" cy="830997"/>
+          </a:xfrm>
+          <a:prstGeom prst="rect">
+            <a:avLst/>
+          </a:prstGeom>
+          <a:noFill/>
+        </p:spPr>
+        <p:txBody>
+          <a:bodyPr wrap="square" rtlCol="0">
+            <a:spAutoFit/>
+          </a:bodyPr>
+          <a:lstStyle/>
+          <a:p>
+            <a:r>
+              <a:rPr lang="en-US" sz="1600" dirty="0"/>
+              <a:t>We can see there are a few outliers in this information.</a:t>
+            </a:r>
+          </a:p>
+        </p:txBody>
+      </p:sp>
+      <p:sp>
+        <p:nvSpPr>
+          <p:cNvPr id="2" name="TextBox 1">
+            <a:extLst>
+              <a:ext uri="{FF2B5EF4-FFF2-40B4-BE49-F238E27FC236}">
+                <a16:creationId xmlns:a16="http://schemas.microsoft.com/office/drawing/2014/main" id="{6C791019-6E7C-92B0-2B72-EF3949CB5109}"/>
+              </a:ext>
+            </a:extLst>
+          </p:cNvPr>
+          <p:cNvSpPr txBox="1"/>
+          <p:nvPr/>
+        </p:nvSpPr>
+        <p:spPr>
+          <a:xfrm>
+            <a:off x="575815" y="4258236"/>
+            <a:ext cx="3325940" cy="1077218"/>
+          </a:xfrm>
+          <a:prstGeom prst="rect">
+            <a:avLst/>
+          </a:prstGeom>
+          <a:noFill/>
+        </p:spPr>
+        <p:txBody>
+          <a:bodyPr wrap="square" rtlCol="0">
+            <a:spAutoFit/>
+          </a:bodyPr>
+          <a:lstStyle/>
+          <a:p>
+            <a:r>
+              <a:rPr lang="en-US" sz="1600" dirty="0"/>
+              <a:t>Looking at this data, individuals with more children have a lower maximum medical charge</a:t>
+            </a:r>
+          </a:p>
+        </p:txBody>
+      </p:sp>
+    </p:spTree>
+    <p:extLst>
+      <p:ext uri="{BB962C8B-B14F-4D97-AF65-F5344CB8AC3E}">
+        <p14:creationId xmlns:p14="http://schemas.microsoft.com/office/powerpoint/2010/main" val="2986563615"/>
+      </p:ext>
+    </p:extLst>
+  </p:cSld>
+  <p:clrMapOvr>
+    <a:masterClrMapping/>
+  </p:clrMapOvr>
+</p:sld>
+</file>
+
+<file path=ppt/slides/slide11.xml><?xml version="1.0" encoding="utf-8"?>
+<p:sld xmlns:a="http://schemas.openxmlformats.org/drawingml/2006/main" xmlns:r="http://schemas.openxmlformats.org/officeDocument/2006/relationships" xmlns:p="http://schemas.openxmlformats.org/presentationml/2006/main">
+  <p:cSld>
+    <p:spTree>
+      <p:nvGrpSpPr>
+        <p:cNvPr id="1" name=""/>
+        <p:cNvGrpSpPr/>
+        <p:nvPr/>
+      </p:nvGrpSpPr>
+      <p:grpSpPr>
+        <a:xfrm>
+          <a:off x="0" y="0"/>
+          <a:ext cx="0" cy="0"/>
+          <a:chOff x="0" y="0"/>
+          <a:chExt cx="0" cy="0"/>
+        </a:xfrm>
+      </p:grpSpPr>
+      <p:sp>
+        <p:nvSpPr>
+          <p:cNvPr id="2" name="Title 1">
+            <a:extLst>
+              <a:ext uri="{FF2B5EF4-FFF2-40B4-BE49-F238E27FC236}">
+                <a16:creationId xmlns:a16="http://schemas.microsoft.com/office/drawing/2014/main" id="{E4FB01BE-1B5D-13B5-9347-B1173FF993C5}"/>
+              </a:ext>
+            </a:extLst>
+          </p:cNvPr>
+          <p:cNvSpPr>
+            <a:spLocks noGrp="1"/>
+          </p:cNvSpPr>
+          <p:nvPr>
+            <p:ph type="title"/>
+          </p:nvPr>
+        </p:nvSpPr>
+        <p:spPr/>
+        <p:txBody>
+          <a:bodyPr/>
+          <a:lstStyle/>
+          <a:p>
+            <a:r>
+              <a:rPr lang="en-US" dirty="0"/>
+              <a:t>How does region and be a (non)smoker affect medical cost?</a:t>
+            </a:r>
+          </a:p>
+        </p:txBody>
+      </p:sp>
+      <p:sp>
+        <p:nvSpPr>
+          <p:cNvPr id="3" name="Content Placeholder 2">
+            <a:extLst>
+              <a:ext uri="{FF2B5EF4-FFF2-40B4-BE49-F238E27FC236}">
+                <a16:creationId xmlns:a16="http://schemas.microsoft.com/office/drawing/2014/main" id="{2B0F9D23-593E-E8C8-187D-EE087C9C0E47}"/>
+              </a:ext>
+            </a:extLst>
+          </p:cNvPr>
+          <p:cNvSpPr>
+            <a:spLocks noGrp="1"/>
+          </p:cNvSpPr>
+          <p:nvPr>
+            <p:ph idx="1"/>
+          </p:nvPr>
+        </p:nvSpPr>
+        <p:spPr/>
+        <p:txBody>
+          <a:bodyPr/>
+          <a:lstStyle/>
+          <a:p>
+            <a:endParaRPr lang="en-US"/>
+          </a:p>
+        </p:txBody>
+      </p:sp>
+      <p:pic>
+        <p:nvPicPr>
+          <p:cNvPr id="4" name="Picture 2">
+            <a:extLst>
+              <a:ext uri="{FF2B5EF4-FFF2-40B4-BE49-F238E27FC236}">
+                <a16:creationId xmlns:a16="http://schemas.microsoft.com/office/drawing/2014/main" id="{2735FBE1-7123-4C15-EB5E-061BE0E57B9A}"/>
+              </a:ext>
+            </a:extLst>
+          </p:cNvPr>
+          <p:cNvPicPr>
+            <a:picLocks noChangeAspect="1" noChangeArrowheads="1"/>
+          </p:cNvPicPr>
+          <p:nvPr/>
+        </p:nvPicPr>
+        <p:blipFill>
+          <a:blip r:embed="rId2">
+            <a:extLst>
+              <a:ext uri="{28A0092B-C50C-407E-A947-70E740481C1C}">
+                <a14:useLocalDpi xmlns:a14="http://schemas.microsoft.com/office/drawing/2010/main" val="0"/>
+              </a:ext>
+            </a:extLst>
+          </a:blip>
+          <a:srcRect/>
+          <a:stretch>
+            <a:fillRect/>
+          </a:stretch>
+        </p:blipFill>
+        <p:spPr bwMode="auto">
+          <a:xfrm>
+            <a:off x="1519527" y="2346742"/>
+            <a:ext cx="3557023" cy="3739903"/>
+          </a:xfrm>
+          <a:prstGeom prst="rect">
+            <a:avLst/>
+          </a:prstGeom>
+          <a:noFill/>
+          <a:extLst>
+            <a:ext uri="{909E8E84-426E-40DD-AFC4-6F175D3DCCD1}">
+              <a14:hiddenFill xmlns:a14="http://schemas.microsoft.com/office/drawing/2010/main">
+                <a:solidFill>
+                  <a:srgbClr val="FFFFFF"/>
+                </a:solidFill>
+              </a14:hiddenFill>
+            </a:ext>
+          </a:extLst>
+        </p:spPr>
+      </p:pic>
+      <p:pic>
+        <p:nvPicPr>
+          <p:cNvPr id="5" name="Picture 4">
+            <a:extLst>
+              <a:ext uri="{FF2B5EF4-FFF2-40B4-BE49-F238E27FC236}">
+                <a16:creationId xmlns:a16="http://schemas.microsoft.com/office/drawing/2014/main" id="{7B354444-1B94-E4DA-93AF-956D65C73421}"/>
+              </a:ext>
+            </a:extLst>
+          </p:cNvPr>
+          <p:cNvPicPr>
+            <a:picLocks noChangeAspect="1" noChangeArrowheads="1"/>
+          </p:cNvPicPr>
+          <p:nvPr/>
+        </p:nvPicPr>
+        <p:blipFill>
+          <a:blip r:embed="rId3">
+            <a:extLst>
+              <a:ext uri="{28A0092B-C50C-407E-A947-70E740481C1C}">
+                <a14:useLocalDpi xmlns:a14="http://schemas.microsoft.com/office/drawing/2010/main" val="0"/>
+              </a:ext>
+            </a:extLst>
+          </a:blip>
+          <a:srcRect/>
+          <a:stretch>
+            <a:fillRect/>
+          </a:stretch>
+        </p:blipFill>
+        <p:spPr bwMode="auto">
+          <a:xfrm>
+            <a:off x="5429552" y="2346742"/>
+            <a:ext cx="4911651" cy="3777552"/>
+          </a:xfrm>
+          <a:prstGeom prst="rect">
+            <a:avLst/>
+          </a:prstGeom>
+          <a:noFill/>
+          <a:extLst>
+            <a:ext uri="{909E8E84-426E-40DD-AFC4-6F175D3DCCD1}">
+              <a14:hiddenFill xmlns:a14="http://schemas.microsoft.com/office/drawing/2010/main">
+                <a:solidFill>
+                  <a:srgbClr val="FFFFFF"/>
+                </a:solidFill>
+              </a14:hiddenFill>
+            </a:ext>
+          </a:extLst>
+        </p:spPr>
+      </p:pic>
+    </p:spTree>
+    <p:extLst>
+      <p:ext uri="{BB962C8B-B14F-4D97-AF65-F5344CB8AC3E}">
+        <p14:creationId xmlns:p14="http://schemas.microsoft.com/office/powerpoint/2010/main" val="3521787242"/>
+      </p:ext>
+    </p:extLst>
+  </p:cSld>
+  <p:clrMapOvr>
+    <a:masterClrMapping/>
+  </p:clrMapOvr>
+</p:sld>
+</file>
+
+<file path=ppt/slides/slide12.xml><?xml version="1.0" encoding="utf-8"?>
+<p:sld xmlns:a="http://schemas.openxmlformats.org/drawingml/2006/main" xmlns:r="http://schemas.openxmlformats.org/officeDocument/2006/relationships" xmlns:p="http://schemas.openxmlformats.org/presentationml/2006/main">
+  <p:cSld>
+    <p:spTree>
+      <p:nvGrpSpPr>
+        <p:cNvPr id="1" name=""/>
+        <p:cNvGrpSpPr/>
+        <p:nvPr/>
+      </p:nvGrpSpPr>
+      <p:grpSpPr>
+        <a:xfrm>
+          <a:off x="0" y="0"/>
+          <a:ext cx="0" cy="0"/>
+          <a:chOff x="0" y="0"/>
+          <a:chExt cx="0" cy="0"/>
+        </a:xfrm>
+      </p:grpSpPr>
+      <p:sp>
+        <p:nvSpPr>
+          <p:cNvPr id="2" name="Title 1">
+            <a:extLst>
+              <a:ext uri="{FF2B5EF4-FFF2-40B4-BE49-F238E27FC236}">
+                <a16:creationId xmlns:a16="http://schemas.microsoft.com/office/drawing/2014/main" id="{59944721-1DAD-6B1C-A8B4-B6B4A1488726}"/>
+              </a:ext>
+            </a:extLst>
+          </p:cNvPr>
+          <p:cNvSpPr>
+            <a:spLocks noGrp="1"/>
+          </p:cNvSpPr>
+          <p:nvPr>
+            <p:ph type="title"/>
+          </p:nvPr>
+        </p:nvSpPr>
+        <p:spPr/>
+        <p:txBody>
+          <a:bodyPr/>
+          <a:lstStyle/>
+          <a:p>
+            <a:r>
+              <a:rPr lang="en-US" dirty="0"/>
+              <a:t>How does region and be a (non)smoker affect medical cost?</a:t>
+            </a:r>
+          </a:p>
+        </p:txBody>
+      </p:sp>
+      <p:sp>
+        <p:nvSpPr>
+          <p:cNvPr id="3" name="Content Placeholder 2">
+            <a:extLst>
+              <a:ext uri="{FF2B5EF4-FFF2-40B4-BE49-F238E27FC236}">
+                <a16:creationId xmlns:a16="http://schemas.microsoft.com/office/drawing/2014/main" id="{DCEE3AD7-CA57-6A49-CA8D-D7B2DA05A602}"/>
+              </a:ext>
+            </a:extLst>
+          </p:cNvPr>
+          <p:cNvSpPr>
+            <a:spLocks noGrp="1"/>
+          </p:cNvSpPr>
+          <p:nvPr>
+            <p:ph idx="1"/>
+          </p:nvPr>
+        </p:nvSpPr>
+        <p:spPr/>
+        <p:txBody>
+          <a:bodyPr/>
+          <a:lstStyle/>
+          <a:p>
+            <a:endParaRPr lang="en-US"/>
+          </a:p>
+        </p:txBody>
+      </p:sp>
+      <p:pic>
+        <p:nvPicPr>
+          <p:cNvPr id="4" name="Picture 2">
+            <a:extLst>
+              <a:ext uri="{FF2B5EF4-FFF2-40B4-BE49-F238E27FC236}">
+                <a16:creationId xmlns:a16="http://schemas.microsoft.com/office/drawing/2014/main" id="{88B7924A-6E61-68CC-51F9-2419BBA712FD}"/>
+              </a:ext>
+            </a:extLst>
+          </p:cNvPr>
+          <p:cNvPicPr>
+            <a:picLocks noChangeAspect="1" noChangeArrowheads="1"/>
+          </p:cNvPicPr>
+          <p:nvPr/>
+        </p:nvPicPr>
+        <p:blipFill>
+          <a:blip r:embed="rId2">
+            <a:extLst>
+              <a:ext uri="{28A0092B-C50C-407E-A947-70E740481C1C}">
+                <a14:useLocalDpi xmlns:a14="http://schemas.microsoft.com/office/drawing/2010/main" val="0"/>
+              </a:ext>
+            </a:extLst>
+          </a:blip>
+          <a:srcRect/>
+          <a:stretch>
+            <a:fillRect/>
+          </a:stretch>
+        </p:blipFill>
+        <p:spPr bwMode="auto">
+          <a:xfrm>
+            <a:off x="1416183" y="2251762"/>
+            <a:ext cx="4549641" cy="3854450"/>
+          </a:xfrm>
+          <a:prstGeom prst="rect">
+            <a:avLst/>
+          </a:prstGeom>
+          <a:noFill/>
+          <a:extLst>
+            <a:ext uri="{909E8E84-426E-40DD-AFC4-6F175D3DCCD1}">
+              <a14:hiddenFill xmlns:a14="http://schemas.microsoft.com/office/drawing/2010/main">
+                <a:solidFill>
+                  <a:srgbClr val="FFFFFF"/>
+                </a:solidFill>
+              </a14:hiddenFill>
+            </a:ext>
+          </a:extLst>
+        </p:spPr>
+      </p:pic>
+      <p:pic>
+        <p:nvPicPr>
+          <p:cNvPr id="5" name="Picture 4">
+            <a:extLst>
+              <a:ext uri="{FF2B5EF4-FFF2-40B4-BE49-F238E27FC236}">
+                <a16:creationId xmlns:a16="http://schemas.microsoft.com/office/drawing/2014/main" id="{189837DE-4E2E-40DF-3AA5-80AC7F6535F2}"/>
+              </a:ext>
+            </a:extLst>
+          </p:cNvPr>
+          <p:cNvPicPr>
+            <a:picLocks noChangeAspect="1" noChangeArrowheads="1"/>
+          </p:cNvPicPr>
+          <p:nvPr/>
+        </p:nvPicPr>
+        <p:blipFill>
+          <a:blip r:embed="rId3">
+            <a:extLst>
+              <a:ext uri="{28A0092B-C50C-407E-A947-70E740481C1C}">
+                <a14:useLocalDpi xmlns:a14="http://schemas.microsoft.com/office/drawing/2010/main" val="0"/>
+              </a:ext>
+            </a:extLst>
+          </a:blip>
+          <a:srcRect/>
+          <a:stretch>
+            <a:fillRect/>
+          </a:stretch>
+        </p:blipFill>
+        <p:spPr bwMode="auto">
+          <a:xfrm>
+            <a:off x="6458295" y="2251762"/>
+            <a:ext cx="4317522" cy="3855716"/>
+          </a:xfrm>
+          <a:prstGeom prst="rect">
+            <a:avLst/>
+          </a:prstGeom>
+          <a:noFill/>
+          <a:extLst>
+            <a:ext uri="{909E8E84-426E-40DD-AFC4-6F175D3DCCD1}">
+              <a14:hiddenFill xmlns:a14="http://schemas.microsoft.com/office/drawing/2010/main">
+                <a:solidFill>
+                  <a:srgbClr val="FFFFFF"/>
+                </a:solidFill>
+              </a14:hiddenFill>
+            </a:ext>
+          </a:extLst>
+        </p:spPr>
+      </p:pic>
+    </p:spTree>
+    <p:extLst>
+      <p:ext uri="{BB962C8B-B14F-4D97-AF65-F5344CB8AC3E}">
+        <p14:creationId xmlns:p14="http://schemas.microsoft.com/office/powerpoint/2010/main" val="4012662218"/>
+      </p:ext>
+    </p:extLst>
+  </p:cSld>
+  <p:clrMapOvr>
+    <a:masterClrMapping/>
+  </p:clrMapOvr>
+</p:sld>
+</file>
+
 <file path=ppt/slides/slide2.xml><?xml version="1.0" encoding="utf-8"?>
 <p:sld xmlns:a="http://schemas.openxmlformats.org/drawingml/2006/main" xmlns:r="http://schemas.openxmlformats.org/officeDocument/2006/relationships" xmlns:p="http://schemas.openxmlformats.org/presentationml/2006/main">
   <p:cSld>
@@ -8930,10 +9454,40 @@
           </a:p>
         </p:txBody>
       </p:sp>
+      <p:pic>
+        <p:nvPicPr>
+          <p:cNvPr id="3" name="Picture 2">
+            <a:extLst>
+              <a:ext uri="{FF2B5EF4-FFF2-40B4-BE49-F238E27FC236}">
+                <a16:creationId xmlns:a16="http://schemas.microsoft.com/office/drawing/2014/main" id="{A3B5F4DA-CFB6-4A5C-113E-CC0B2D646FC7}"/>
+              </a:ext>
+            </a:extLst>
+          </p:cNvPr>
+          <p:cNvPicPr>
+            <a:picLocks noChangeAspect="1"/>
+          </p:cNvPicPr>
+          <p:nvPr/>
+        </p:nvPicPr>
+        <p:blipFill>
+          <a:blip r:embed="rId2"/>
+          <a:stretch>
+            <a:fillRect/>
+          </a:stretch>
+        </p:blipFill>
+        <p:spPr>
+          <a:xfrm>
+            <a:off x="3414712" y="1943100"/>
+            <a:ext cx="5362575" cy="4314825"/>
+          </a:xfrm>
+          <a:prstGeom prst="rect">
+            <a:avLst/>
+          </a:prstGeom>
+        </p:spPr>
+      </p:pic>
     </p:spTree>
     <p:extLst>
       <p:ext uri="{BB962C8B-B14F-4D97-AF65-F5344CB8AC3E}">
-        <p14:creationId xmlns:p14="http://schemas.microsoft.com/office/powerpoint/2010/main" val="3128314669"/>
+        <p14:creationId xmlns:p14="http://schemas.microsoft.com/office/powerpoint/2010/main" val="3957504030"/>
       </p:ext>
     </p:extLst>
   </p:cSld>
@@ -8965,7 +9519,7 @@
           <p:cNvPr id="2" name="Title 1">
             <a:extLst>
               <a:ext uri="{FF2B5EF4-FFF2-40B4-BE49-F238E27FC236}">
-                <a16:creationId xmlns:a16="http://schemas.microsoft.com/office/drawing/2014/main" id="{310F02B5-B834-4941-D4CF-1C81F4D4C894}"/>
+                <a16:creationId xmlns:a16="http://schemas.microsoft.com/office/drawing/2014/main" id="{96E2A55D-3E79-8BDD-6C8C-6B1A3A5CF30B}"/>
               </a:ext>
             </a:extLst>
           </p:cNvPr>
@@ -8983,15 +9537,50 @@
           <a:p>
             <a:r>
               <a:rPr lang="en-US" dirty="0"/>
-              <a:t>How does BMI affect medical cost?</a:t>
+              <a:t>How does sex and age affect medical cost?</a:t>
             </a:r>
           </a:p>
         </p:txBody>
       </p:sp>
+      <p:pic>
+        <p:nvPicPr>
+          <p:cNvPr id="3" name="Picture 2">
+            <a:extLst>
+              <a:ext uri="{FF2B5EF4-FFF2-40B4-BE49-F238E27FC236}">
+                <a16:creationId xmlns:a16="http://schemas.microsoft.com/office/drawing/2014/main" id="{A3B5F4DA-CFB6-4A5C-113E-CC0B2D646FC7}"/>
+              </a:ext>
+            </a:extLst>
+          </p:cNvPr>
+          <p:cNvPicPr>
+            <a:picLocks noChangeAspect="1"/>
+          </p:cNvPicPr>
+          <p:nvPr/>
+        </p:nvPicPr>
+        <p:blipFill>
+          <a:blip r:embed="rId2">
+            <a:extLst>
+              <a:ext uri="{28A0092B-C50C-407E-A947-70E740481C1C}">
+                <a14:useLocalDpi xmlns:a14="http://schemas.microsoft.com/office/drawing/2010/main" val="0"/>
+              </a:ext>
+            </a:extLst>
+          </a:blip>
+          <a:srcRect/>
+          <a:stretch/>
+        </p:blipFill>
+        <p:spPr>
+          <a:xfrm>
+            <a:off x="2488366" y="1943100"/>
+            <a:ext cx="7215268" cy="4281386"/>
+          </a:xfrm>
+          <a:prstGeom prst="rect">
+            <a:avLst/>
+          </a:prstGeom>
+        </p:spPr>
+      </p:pic>
     </p:spTree>
     <p:extLst>
       <p:ext uri="{BB962C8B-B14F-4D97-AF65-F5344CB8AC3E}">
-        <p14:creationId xmlns:p14="http://schemas.microsoft.com/office/powerpoint/2010/main" val="2267381283"/>
+        <p14:creationId xmlns:p14="http://schemas.microsoft.com/office/powerpoint/2010/main" val="3394503721"/>
       </p:ext>
     </p:extLst>
   </p:cSld>
@@ -9023,7 +9612,7 @@
           <p:cNvPr id="2" name="Title 1">
             <a:extLst>
               <a:ext uri="{FF2B5EF4-FFF2-40B4-BE49-F238E27FC236}">
-                <a16:creationId xmlns:a16="http://schemas.microsoft.com/office/drawing/2014/main" id="{FBA16AE9-5978-34DE-9AA4-2525DE3468AB}"/>
+                <a16:creationId xmlns:a16="http://schemas.microsoft.com/office/drawing/2014/main" id="{96E2A55D-3E79-8BDD-6C8C-6B1A3A5CF30B}"/>
               </a:ext>
             </a:extLst>
           </p:cNvPr>
@@ -9034,36 +9623,24 @@
             <p:ph type="title"/>
           </p:nvPr>
         </p:nvSpPr>
-        <p:spPr>
-          <a:xfrm>
-            <a:off x="6705439" y="471101"/>
-            <a:ext cx="4569755" cy="1911741"/>
-          </a:xfrm>
-        </p:spPr>
+        <p:spPr/>
         <p:txBody>
-          <a:bodyPr>
-            <a:normAutofit/>
-          </a:bodyPr>
+          <a:bodyPr/>
           <a:lstStyle/>
           <a:p>
-            <a:pPr algn="r">
-              <a:lnSpc>
-                <a:spcPct val="110000"/>
-              </a:lnSpc>
-            </a:pPr>
             <a:r>
-              <a:rPr lang="en-US" sz="3700" dirty="0"/>
-              <a:t>How does number of children affect medical cost?</a:t>
+              <a:rPr lang="en-US" dirty="0"/>
+              <a:t>How does sex and age affect medical cost?</a:t>
             </a:r>
           </a:p>
         </p:txBody>
       </p:sp>
       <p:pic>
         <p:nvPicPr>
-          <p:cNvPr id="4" name="Content Placeholder 3" descr="A graph of blue rectangular bars&#10;&#10;Description automatically generated">
-            <a:extLst>
-              <a:ext uri="{FF2B5EF4-FFF2-40B4-BE49-F238E27FC236}">
-                <a16:creationId xmlns:a16="http://schemas.microsoft.com/office/drawing/2014/main" id="{05F8B313-8262-FBA5-C17B-A13F791202E1}"/>
+          <p:cNvPr id="3" name="Picture 2">
+            <a:extLst>
+              <a:ext uri="{FF2B5EF4-FFF2-40B4-BE49-F238E27FC236}">
+                <a16:creationId xmlns:a16="http://schemas.microsoft.com/office/drawing/2014/main" id="{A3B5F4DA-CFB6-4A5C-113E-CC0B2D646FC7}"/>
               </a:ext>
             </a:extLst>
           </p:cNvPr>
@@ -9073,60 +9650,30 @@
           <p:nvPr/>
         </p:nvPicPr>
         <p:blipFill>
-          <a:blip r:embed="rId2"/>
-          <a:stretch>
-            <a:fillRect/>
-          </a:stretch>
+          <a:blip r:embed="rId2">
+            <a:extLst>
+              <a:ext uri="{28A0092B-C50C-407E-A947-70E740481C1C}">
+                <a14:useLocalDpi xmlns:a14="http://schemas.microsoft.com/office/drawing/2010/main" val="0"/>
+              </a:ext>
+            </a:extLst>
+          </a:blip>
+          <a:srcRect/>
+          <a:stretch/>
         </p:blipFill>
         <p:spPr>
           <a:xfrm>
-            <a:off x="757404" y="1751607"/>
-            <a:ext cx="6146743" cy="4732991"/>
+            <a:off x="2496350" y="1943100"/>
+            <a:ext cx="7199299" cy="4271910"/>
           </a:xfrm>
           <a:prstGeom prst="rect">
             <a:avLst/>
           </a:prstGeom>
         </p:spPr>
       </p:pic>
-      <p:sp>
-        <p:nvSpPr>
-          <p:cNvPr id="8" name="Content Placeholder 7">
-            <a:extLst>
-              <a:ext uri="{FF2B5EF4-FFF2-40B4-BE49-F238E27FC236}">
-                <a16:creationId xmlns:a16="http://schemas.microsoft.com/office/drawing/2014/main" id="{63538DCD-9A0D-40E2-12E1-A5641C2503DB}"/>
-              </a:ext>
-            </a:extLst>
-          </p:cNvPr>
-          <p:cNvSpPr>
-            <a:spLocks noGrp="1"/>
-          </p:cNvSpPr>
-          <p:nvPr>
-            <p:ph idx="1"/>
-          </p:nvPr>
-        </p:nvSpPr>
-        <p:spPr>
-          <a:xfrm>
-            <a:off x="7308072" y="3966952"/>
-            <a:ext cx="3764655" cy="3215683"/>
-          </a:xfrm>
-        </p:spPr>
-        <p:txBody>
-          <a:bodyPr>
-            <a:normAutofit/>
-          </a:bodyPr>
-          <a:lstStyle/>
-          <a:p>
-            <a:r>
-              <a:rPr lang="en-US" dirty="0"/>
-              <a:t>In this bar chart we see that people who have no children pay an average of $12,365, 1-2 children $13,727 and 3 or more children pay an average of $14,576 after insurance. </a:t>
-            </a:r>
-          </a:p>
-        </p:txBody>
-      </p:sp>
     </p:spTree>
     <p:extLst>
       <p:ext uri="{BB962C8B-B14F-4D97-AF65-F5344CB8AC3E}">
-        <p14:creationId xmlns:p14="http://schemas.microsoft.com/office/powerpoint/2010/main" val="1595576206"/>
+        <p14:creationId xmlns:p14="http://schemas.microsoft.com/office/powerpoint/2010/main" val="2470507594"/>
       </p:ext>
     </p:extLst>
   </p:cSld>
@@ -9153,12 +9700,45 @@
           <a:chExt cx="0" cy="0"/>
         </a:xfrm>
       </p:grpSpPr>
+      <p:sp>
+        <p:nvSpPr>
+          <p:cNvPr id="2" name="Title 1">
+            <a:extLst>
+              <a:ext uri="{FF2B5EF4-FFF2-40B4-BE49-F238E27FC236}">
+                <a16:creationId xmlns:a16="http://schemas.microsoft.com/office/drawing/2014/main" id="{310F02B5-B834-4941-D4CF-1C81F4D4C894}"/>
+              </a:ext>
+            </a:extLst>
+          </p:cNvPr>
+          <p:cNvSpPr>
+            <a:spLocks noGrp="1"/>
+          </p:cNvSpPr>
+          <p:nvPr>
+            <p:ph type="title"/>
+          </p:nvPr>
+        </p:nvSpPr>
+        <p:spPr>
+          <a:xfrm>
+            <a:off x="1219200" y="365125"/>
+            <a:ext cx="9493249" cy="1067749"/>
+          </a:xfrm>
+        </p:spPr>
+        <p:txBody>
+          <a:bodyPr/>
+          <a:lstStyle/>
+          <a:p>
+            <a:r>
+              <a:rPr lang="en-US" dirty="0"/>
+              <a:t>How does BMI affect medical cost?</a:t>
+            </a:r>
+          </a:p>
+        </p:txBody>
+      </p:sp>
       <p:pic>
         <p:nvPicPr>
-          <p:cNvPr id="4" name="Content Placeholder 3">
-            <a:extLst>
-              <a:ext uri="{FF2B5EF4-FFF2-40B4-BE49-F238E27FC236}">
-                <a16:creationId xmlns:a16="http://schemas.microsoft.com/office/drawing/2014/main" id="{C22740F8-3FB5-3267-1679-9CA11BDC971E}"/>
+          <p:cNvPr id="7" name="Content Placeholder 6">
+            <a:extLst>
+              <a:ext uri="{FF2B5EF4-FFF2-40B4-BE49-F238E27FC236}">
+                <a16:creationId xmlns:a16="http://schemas.microsoft.com/office/drawing/2014/main" id="{FDFEABF2-99CB-DD6A-DA4C-169E9A90E9C6}"/>
               </a:ext>
             </a:extLst>
           </p:cNvPr>
@@ -9177,123 +9757,48 @@
         </p:blipFill>
         <p:spPr>
           <a:xfrm>
-            <a:off x="4527022" y="1007042"/>
-            <a:ext cx="7089163" cy="4843915"/>
+            <a:off x="6315075" y="1876391"/>
+            <a:ext cx="5438774" cy="4314825"/>
           </a:xfrm>
           <a:prstGeom prst="rect">
             <a:avLst/>
           </a:prstGeom>
         </p:spPr>
       </p:pic>
-      <p:sp>
-        <p:nvSpPr>
-          <p:cNvPr id="5" name="TextBox 4">
-            <a:extLst>
-              <a:ext uri="{FF2B5EF4-FFF2-40B4-BE49-F238E27FC236}">
-                <a16:creationId xmlns:a16="http://schemas.microsoft.com/office/drawing/2014/main" id="{B3675EEF-1D51-0B81-44A1-5716908A4A0C}"/>
-              </a:ext>
-            </a:extLst>
-          </p:cNvPr>
-          <p:cNvSpPr txBox="1"/>
+      <p:pic>
+        <p:nvPicPr>
+          <p:cNvPr id="9" name="Picture 8">
+            <a:extLst>
+              <a:ext uri="{FF2B5EF4-FFF2-40B4-BE49-F238E27FC236}">
+                <a16:creationId xmlns:a16="http://schemas.microsoft.com/office/drawing/2014/main" id="{CB547AD7-EA2C-24E8-0356-2A78B50A4AFE}"/>
+              </a:ext>
+            </a:extLst>
+          </p:cNvPr>
+          <p:cNvPicPr>
+            <a:picLocks noChangeAspect="1"/>
+          </p:cNvPicPr>
           <p:nvPr/>
-        </p:nvSpPr>
+        </p:nvPicPr>
+        <p:blipFill>
+          <a:blip r:embed="rId3"/>
+          <a:stretch>
+            <a:fillRect/>
+          </a:stretch>
+        </p:blipFill>
         <p:spPr>
           <a:xfrm>
-            <a:off x="575815" y="1007042"/>
-            <a:ext cx="3601549" cy="1323439"/>
+            <a:off x="438150" y="1876390"/>
+            <a:ext cx="5438775" cy="4314825"/>
           </a:xfrm>
           <a:prstGeom prst="rect">
             <a:avLst/>
           </a:prstGeom>
-          <a:noFill/>
         </p:spPr>
-        <p:txBody>
-          <a:bodyPr wrap="square" rtlCol="0">
-            <a:spAutoFit/>
-          </a:bodyPr>
-          <a:lstStyle/>
-          <a:p>
-            <a:r>
-              <a:rPr lang="en-US" sz="1600" dirty="0"/>
-              <a:t>Here we have a scatterplot that shows a trend that looks like people with no children tend to have bigger medical charges. </a:t>
-            </a:r>
-          </a:p>
-        </p:txBody>
-      </p:sp>
-      <p:sp>
-        <p:nvSpPr>
-          <p:cNvPr id="6" name="TextBox 5">
-            <a:extLst>
-              <a:ext uri="{FF2B5EF4-FFF2-40B4-BE49-F238E27FC236}">
-                <a16:creationId xmlns:a16="http://schemas.microsoft.com/office/drawing/2014/main" id="{DD36C097-4FFF-587D-7AD9-F42A0EE334F6}"/>
-              </a:ext>
-            </a:extLst>
-          </p:cNvPr>
-          <p:cNvSpPr txBox="1"/>
-          <p:nvPr/>
-        </p:nvSpPr>
-        <p:spPr>
-          <a:xfrm>
-            <a:off x="575815" y="2878860"/>
-            <a:ext cx="3282215" cy="830997"/>
-          </a:xfrm>
-          <a:prstGeom prst="rect">
-            <a:avLst/>
-          </a:prstGeom>
-          <a:noFill/>
-        </p:spPr>
-        <p:txBody>
-          <a:bodyPr wrap="square" rtlCol="0">
-            <a:spAutoFit/>
-          </a:bodyPr>
-          <a:lstStyle/>
-          <a:p>
-            <a:r>
-              <a:rPr lang="en-US" sz="1600" dirty="0"/>
-              <a:t>We can see there are a few outliers in this information.</a:t>
-            </a:r>
-          </a:p>
-        </p:txBody>
-      </p:sp>
-      <p:sp>
-        <p:nvSpPr>
-          <p:cNvPr id="2" name="TextBox 1">
-            <a:extLst>
-              <a:ext uri="{FF2B5EF4-FFF2-40B4-BE49-F238E27FC236}">
-                <a16:creationId xmlns:a16="http://schemas.microsoft.com/office/drawing/2014/main" id="{6C791019-6E7C-92B0-2B72-EF3949CB5109}"/>
-              </a:ext>
-            </a:extLst>
-          </p:cNvPr>
-          <p:cNvSpPr txBox="1"/>
-          <p:nvPr/>
-        </p:nvSpPr>
-        <p:spPr>
-          <a:xfrm>
-            <a:off x="575815" y="4258236"/>
-            <a:ext cx="3325940" cy="1077218"/>
-          </a:xfrm>
-          <a:prstGeom prst="rect">
-            <a:avLst/>
-          </a:prstGeom>
-          <a:noFill/>
-        </p:spPr>
-        <p:txBody>
-          <a:bodyPr wrap="square" rtlCol="0">
-            <a:spAutoFit/>
-          </a:bodyPr>
-          <a:lstStyle/>
-          <a:p>
-            <a:r>
-              <a:rPr lang="en-US" sz="1600" dirty="0"/>
-              <a:t>Looking at this data, individuals with more children have a lower maximum medical charge</a:t>
-            </a:r>
-          </a:p>
-        </p:txBody>
-      </p:sp>
+      </p:pic>
     </p:spTree>
     <p:extLst>
       <p:ext uri="{BB962C8B-B14F-4D97-AF65-F5344CB8AC3E}">
-        <p14:creationId xmlns:p14="http://schemas.microsoft.com/office/powerpoint/2010/main" val="2986563615"/>
+        <p14:creationId xmlns:p14="http://schemas.microsoft.com/office/powerpoint/2010/main" val="2205354574"/>
       </p:ext>
     </p:extLst>
   </p:cSld>
@@ -9325,7 +9830,7 @@
           <p:cNvPr id="2" name="Title 1">
             <a:extLst>
               <a:ext uri="{FF2B5EF4-FFF2-40B4-BE49-F238E27FC236}">
-                <a16:creationId xmlns:a16="http://schemas.microsoft.com/office/drawing/2014/main" id="{E4FB01BE-1B5D-13B5-9347-B1173FF993C5}"/>
+                <a16:creationId xmlns:a16="http://schemas.microsoft.com/office/drawing/2014/main" id="{310F02B5-B834-4941-D4CF-1C81F4D4C894}"/>
               </a:ext>
             </a:extLst>
           </p:cNvPr>
@@ -9336,54 +9841,34 @@
             <p:ph type="title"/>
           </p:nvPr>
         </p:nvSpPr>
-        <p:spPr/>
+        <p:spPr>
+          <a:xfrm>
+            <a:off x="1219200" y="365125"/>
+            <a:ext cx="9493249" cy="1067749"/>
+          </a:xfrm>
+        </p:spPr>
         <p:txBody>
           <a:bodyPr/>
           <a:lstStyle/>
           <a:p>
             <a:r>
               <a:rPr lang="en-US" dirty="0"/>
-              <a:t>How does region and be a (non)smoker affect medical cost?</a:t>
+              <a:t>How does BMI affect medical cost?</a:t>
             </a:r>
-          </a:p>
-        </p:txBody>
-      </p:sp>
-      <p:sp>
-        <p:nvSpPr>
-          <p:cNvPr id="3" name="Content Placeholder 2">
-            <a:extLst>
-              <a:ext uri="{FF2B5EF4-FFF2-40B4-BE49-F238E27FC236}">
-                <a16:creationId xmlns:a16="http://schemas.microsoft.com/office/drawing/2014/main" id="{2B0F9D23-593E-E8C8-187D-EE087C9C0E47}"/>
-              </a:ext>
-            </a:extLst>
-          </p:cNvPr>
-          <p:cNvSpPr>
-            <a:spLocks noGrp="1"/>
-          </p:cNvSpPr>
-          <p:nvPr>
-            <p:ph idx="1"/>
-          </p:nvPr>
-        </p:nvSpPr>
-        <p:spPr/>
-        <p:txBody>
-          <a:bodyPr/>
-          <a:lstStyle/>
-          <a:p>
-            <a:endParaRPr lang="en-US"/>
           </a:p>
         </p:txBody>
       </p:sp>
       <p:pic>
         <p:nvPicPr>
-          <p:cNvPr id="4" name="Picture 2">
-            <a:extLst>
-              <a:ext uri="{FF2B5EF4-FFF2-40B4-BE49-F238E27FC236}">
-                <a16:creationId xmlns:a16="http://schemas.microsoft.com/office/drawing/2014/main" id="{2735FBE1-7123-4C15-EB5E-061BE0E57B9A}"/>
+          <p:cNvPr id="5" name="Picture 4">
+            <a:extLst>
+              <a:ext uri="{FF2B5EF4-FFF2-40B4-BE49-F238E27FC236}">
+                <a16:creationId xmlns:a16="http://schemas.microsoft.com/office/drawing/2014/main" id="{DE0DDA0B-3D9E-22BA-CFD4-7BDDD66EB0EB}"/>
               </a:ext>
             </a:extLst>
           </p:cNvPr>
           <p:cNvPicPr>
-            <a:picLocks noChangeAspect="1" noChangeArrowheads="1"/>
+            <a:picLocks noChangeAspect="1"/>
           </p:cNvPicPr>
           <p:nvPr/>
         </p:nvPicPr>
@@ -9396,81 +9881,52 @@
             </a:extLst>
           </a:blip>
           <a:srcRect/>
+          <a:stretch/>
+        </p:blipFill>
+        <p:spPr>
+          <a:xfrm>
+            <a:off x="6370700" y="2009775"/>
+            <a:ext cx="5114840" cy="3933825"/>
+          </a:xfrm>
+          <a:prstGeom prst="rect">
+            <a:avLst/>
+          </a:prstGeom>
+        </p:spPr>
+      </p:pic>
+      <p:pic>
+        <p:nvPicPr>
+          <p:cNvPr id="6" name="Picture 5">
+            <a:extLst>
+              <a:ext uri="{FF2B5EF4-FFF2-40B4-BE49-F238E27FC236}">
+                <a16:creationId xmlns:a16="http://schemas.microsoft.com/office/drawing/2014/main" id="{90F15A38-788A-0745-F782-D6EF567F8733}"/>
+              </a:ext>
+            </a:extLst>
+          </p:cNvPr>
+          <p:cNvPicPr>
+            <a:picLocks noChangeAspect="1"/>
+          </p:cNvPicPr>
+          <p:nvPr/>
+        </p:nvPicPr>
+        <p:blipFill>
+          <a:blip r:embed="rId3"/>
           <a:stretch>
             <a:fillRect/>
           </a:stretch>
         </p:blipFill>
-        <p:spPr bwMode="auto">
+        <p:spPr>
           <a:xfrm>
-            <a:off x="1519527" y="2346742"/>
-            <a:ext cx="3557023" cy="3739903"/>
+            <a:off x="549254" y="2011339"/>
+            <a:ext cx="5114987" cy="3932261"/>
           </a:xfrm>
           <a:prstGeom prst="rect">
             <a:avLst/>
           </a:prstGeom>
-          <a:noFill/>
-          <a:extLst>
-            <a:ext uri="{909E8E84-426E-40DD-AFC4-6F175D3DCCD1}">
-              <a14:hiddenFill xmlns:a14="http://schemas.microsoft.com/office/drawing/2010/main">
-                <a:solidFill>
-                  <a:srgbClr val="FFFFFF"/>
-                </a:solidFill>
-              </a14:hiddenFill>
-            </a:ext>
-          </a:extLst>
-        </p:spPr>
-      </p:pic>
-      <p:pic>
-        <p:nvPicPr>
-          <p:cNvPr id="5" name="Picture 4">
-            <a:extLst>
-              <a:ext uri="{FF2B5EF4-FFF2-40B4-BE49-F238E27FC236}">
-                <a16:creationId xmlns:a16="http://schemas.microsoft.com/office/drawing/2014/main" id="{7B354444-1B94-E4DA-93AF-956D65C73421}"/>
-              </a:ext>
-            </a:extLst>
-          </p:cNvPr>
-          <p:cNvPicPr>
-            <a:picLocks noChangeAspect="1" noChangeArrowheads="1"/>
-          </p:cNvPicPr>
-          <p:nvPr/>
-        </p:nvPicPr>
-        <p:blipFill>
-          <a:blip r:embed="rId3">
-            <a:extLst>
-              <a:ext uri="{28A0092B-C50C-407E-A947-70E740481C1C}">
-                <a14:useLocalDpi xmlns:a14="http://schemas.microsoft.com/office/drawing/2010/main" val="0"/>
-              </a:ext>
-            </a:extLst>
-          </a:blip>
-          <a:srcRect/>
-          <a:stretch>
-            <a:fillRect/>
-          </a:stretch>
-        </p:blipFill>
-        <p:spPr bwMode="auto">
-          <a:xfrm>
-            <a:off x="5429552" y="2346742"/>
-            <a:ext cx="4911651" cy="3777552"/>
-          </a:xfrm>
-          <a:prstGeom prst="rect">
-            <a:avLst/>
-          </a:prstGeom>
-          <a:noFill/>
-          <a:extLst>
-            <a:ext uri="{909E8E84-426E-40DD-AFC4-6F175D3DCCD1}">
-              <a14:hiddenFill xmlns:a14="http://schemas.microsoft.com/office/drawing/2010/main">
-                <a:solidFill>
-                  <a:srgbClr val="FFFFFF"/>
-                </a:solidFill>
-              </a14:hiddenFill>
-            </a:ext>
-          </a:extLst>
         </p:spPr>
       </p:pic>
     </p:spTree>
     <p:extLst>
       <p:ext uri="{BB962C8B-B14F-4D97-AF65-F5344CB8AC3E}">
-        <p14:creationId xmlns:p14="http://schemas.microsoft.com/office/powerpoint/2010/main" val="3521787242"/>
+        <p14:creationId xmlns:p14="http://schemas.microsoft.com/office/powerpoint/2010/main" val="1250344605"/>
       </p:ext>
     </p:extLst>
   </p:cSld>
@@ -9502,7 +9958,7 @@
           <p:cNvPr id="2" name="Title 1">
             <a:extLst>
               <a:ext uri="{FF2B5EF4-FFF2-40B4-BE49-F238E27FC236}">
-                <a16:creationId xmlns:a16="http://schemas.microsoft.com/office/drawing/2014/main" id="{59944721-1DAD-6B1C-A8B4-B6B4A1488726}"/>
+                <a16:creationId xmlns:a16="http://schemas.microsoft.com/office/drawing/2014/main" id="{FBA16AE9-5978-34DE-9AA4-2525DE3468AB}"/>
               </a:ext>
             </a:extLst>
           </p:cNvPr>
@@ -9513,24 +9969,66 @@
             <p:ph type="title"/>
           </p:nvPr>
         </p:nvSpPr>
-        <p:spPr/>
+        <p:spPr>
+          <a:xfrm>
+            <a:off x="6705439" y="471101"/>
+            <a:ext cx="4569755" cy="1911741"/>
+          </a:xfrm>
+        </p:spPr>
         <p:txBody>
-          <a:bodyPr/>
+          <a:bodyPr>
+            <a:normAutofit/>
+          </a:bodyPr>
           <a:lstStyle/>
           <a:p>
+            <a:pPr algn="r">
+              <a:lnSpc>
+                <a:spcPct val="110000"/>
+              </a:lnSpc>
+            </a:pPr>
             <a:r>
-              <a:rPr lang="en-US" dirty="0"/>
-              <a:t>How does region and be a (non)smoker affect medical cost?</a:t>
+              <a:rPr lang="en-US" sz="3700" dirty="0"/>
+              <a:t>How does number of children affect medical cost?</a:t>
             </a:r>
           </a:p>
         </p:txBody>
       </p:sp>
+      <p:pic>
+        <p:nvPicPr>
+          <p:cNvPr id="4" name="Content Placeholder 3" descr="A graph of blue rectangular bars&#10;&#10;Description automatically generated">
+            <a:extLst>
+              <a:ext uri="{FF2B5EF4-FFF2-40B4-BE49-F238E27FC236}">
+                <a16:creationId xmlns:a16="http://schemas.microsoft.com/office/drawing/2014/main" id="{05F8B313-8262-FBA5-C17B-A13F791202E1}"/>
+              </a:ext>
+            </a:extLst>
+          </p:cNvPr>
+          <p:cNvPicPr>
+            <a:picLocks noChangeAspect="1"/>
+          </p:cNvPicPr>
+          <p:nvPr/>
+        </p:nvPicPr>
+        <p:blipFill>
+          <a:blip r:embed="rId2"/>
+          <a:stretch>
+            <a:fillRect/>
+          </a:stretch>
+        </p:blipFill>
+        <p:spPr>
+          <a:xfrm>
+            <a:off x="757404" y="1751607"/>
+            <a:ext cx="6146743" cy="4732991"/>
+          </a:xfrm>
+          <a:prstGeom prst="rect">
+            <a:avLst/>
+          </a:prstGeom>
+        </p:spPr>
+      </p:pic>
       <p:sp>
         <p:nvSpPr>
-          <p:cNvPr id="3" name="Content Placeholder 2">
-            <a:extLst>
-              <a:ext uri="{FF2B5EF4-FFF2-40B4-BE49-F238E27FC236}">
-                <a16:creationId xmlns:a16="http://schemas.microsoft.com/office/drawing/2014/main" id="{DCEE3AD7-CA57-6A49-CA8D-D7B2DA05A602}"/>
+          <p:cNvPr id="8" name="Content Placeholder 7">
+            <a:extLst>
+              <a:ext uri="{FF2B5EF4-FFF2-40B4-BE49-F238E27FC236}">
+                <a16:creationId xmlns:a16="http://schemas.microsoft.com/office/drawing/2014/main" id="{63538DCD-9A0D-40E2-12E1-A5641C2503DB}"/>
               </a:ext>
             </a:extLst>
           </p:cNvPr>
@@ -9541,113 +10039,29 @@
             <p:ph idx="1"/>
           </p:nvPr>
         </p:nvSpPr>
-        <p:spPr/>
+        <p:spPr>
+          <a:xfrm>
+            <a:off x="7308072" y="3966952"/>
+            <a:ext cx="3764655" cy="3215683"/>
+          </a:xfrm>
+        </p:spPr>
         <p:txBody>
-          <a:bodyPr/>
+          <a:bodyPr>
+            <a:normAutofit/>
+          </a:bodyPr>
           <a:lstStyle/>
           <a:p>
-            <a:endParaRPr lang="en-US"/>
+            <a:r>
+              <a:rPr lang="en-US" dirty="0"/>
+              <a:t>In this bar chart we see that people who have no children pay an average of $12,365, 1-2 children $13,727 and 3 or more children pay an average of $14,576 after insurance. </a:t>
+            </a:r>
           </a:p>
         </p:txBody>
       </p:sp>
-      <p:pic>
-        <p:nvPicPr>
-          <p:cNvPr id="4" name="Picture 2">
-            <a:extLst>
-              <a:ext uri="{FF2B5EF4-FFF2-40B4-BE49-F238E27FC236}">
-                <a16:creationId xmlns:a16="http://schemas.microsoft.com/office/drawing/2014/main" id="{88B7924A-6E61-68CC-51F9-2419BBA712FD}"/>
-              </a:ext>
-            </a:extLst>
-          </p:cNvPr>
-          <p:cNvPicPr>
-            <a:picLocks noChangeAspect="1" noChangeArrowheads="1"/>
-          </p:cNvPicPr>
-          <p:nvPr/>
-        </p:nvPicPr>
-        <p:blipFill>
-          <a:blip r:embed="rId2">
-            <a:extLst>
-              <a:ext uri="{28A0092B-C50C-407E-A947-70E740481C1C}">
-                <a14:useLocalDpi xmlns:a14="http://schemas.microsoft.com/office/drawing/2010/main" val="0"/>
-              </a:ext>
-            </a:extLst>
-          </a:blip>
-          <a:srcRect/>
-          <a:stretch>
-            <a:fillRect/>
-          </a:stretch>
-        </p:blipFill>
-        <p:spPr bwMode="auto">
-          <a:xfrm>
-            <a:off x="1416183" y="2251762"/>
-            <a:ext cx="4549641" cy="3854450"/>
-          </a:xfrm>
-          <a:prstGeom prst="rect">
-            <a:avLst/>
-          </a:prstGeom>
-          <a:noFill/>
-          <a:extLst>
-            <a:ext uri="{909E8E84-426E-40DD-AFC4-6F175D3DCCD1}">
-              <a14:hiddenFill xmlns:a14="http://schemas.microsoft.com/office/drawing/2010/main">
-                <a:solidFill>
-                  <a:srgbClr val="FFFFFF"/>
-                </a:solidFill>
-              </a14:hiddenFill>
-            </a:ext>
-          </a:extLst>
-        </p:spPr>
-      </p:pic>
-      <p:pic>
-        <p:nvPicPr>
-          <p:cNvPr id="5" name="Picture 4">
-            <a:extLst>
-              <a:ext uri="{FF2B5EF4-FFF2-40B4-BE49-F238E27FC236}">
-                <a16:creationId xmlns:a16="http://schemas.microsoft.com/office/drawing/2014/main" id="{189837DE-4E2E-40DF-3AA5-80AC7F6535F2}"/>
-              </a:ext>
-            </a:extLst>
-          </p:cNvPr>
-          <p:cNvPicPr>
-            <a:picLocks noChangeAspect="1" noChangeArrowheads="1"/>
-          </p:cNvPicPr>
-          <p:nvPr/>
-        </p:nvPicPr>
-        <p:blipFill>
-          <a:blip r:embed="rId3">
-            <a:extLst>
-              <a:ext uri="{28A0092B-C50C-407E-A947-70E740481C1C}">
-                <a14:useLocalDpi xmlns:a14="http://schemas.microsoft.com/office/drawing/2010/main" val="0"/>
-              </a:ext>
-            </a:extLst>
-          </a:blip>
-          <a:srcRect/>
-          <a:stretch>
-            <a:fillRect/>
-          </a:stretch>
-        </p:blipFill>
-        <p:spPr bwMode="auto">
-          <a:xfrm>
-            <a:off x="6458295" y="2251762"/>
-            <a:ext cx="4317522" cy="3855716"/>
-          </a:xfrm>
-          <a:prstGeom prst="rect">
-            <a:avLst/>
-          </a:prstGeom>
-          <a:noFill/>
-          <a:extLst>
-            <a:ext uri="{909E8E84-426E-40DD-AFC4-6F175D3DCCD1}">
-              <a14:hiddenFill xmlns:a14="http://schemas.microsoft.com/office/drawing/2010/main">
-                <a:solidFill>
-                  <a:srgbClr val="FFFFFF"/>
-                </a:solidFill>
-              </a14:hiddenFill>
-            </a:ext>
-          </a:extLst>
-        </p:spPr>
-      </p:pic>
     </p:spTree>
     <p:extLst>
       <p:ext uri="{BB962C8B-B14F-4D97-AF65-F5344CB8AC3E}">
-        <p14:creationId xmlns:p14="http://schemas.microsoft.com/office/powerpoint/2010/main" val="4012662218"/>
+        <p14:creationId xmlns:p14="http://schemas.microsoft.com/office/powerpoint/2010/main" val="1595576206"/>
       </p:ext>
     </p:extLst>
   </p:cSld>

</xml_diff>

<commit_message>
Uploading final slide deck
</commit_message>
<xml_diff>
--- a/Medical Cost After Insurance.pptx
+++ b/Medical Cost After Insurance.pptx
@@ -14,9 +14,10 @@
     <p:sldId id="269" r:id="rId8"/>
     <p:sldId id="270" r:id="rId9"/>
     <p:sldId id="264" r:id="rId10"/>
-    <p:sldId id="266" r:id="rId11"/>
-    <p:sldId id="262" r:id="rId12"/>
-    <p:sldId id="263" r:id="rId13"/>
+    <p:sldId id="271" r:id="rId11"/>
+    <p:sldId id="266" r:id="rId12"/>
+    <p:sldId id="262" r:id="rId13"/>
+    <p:sldId id="263" r:id="rId14"/>
   </p:sldIdLst>
   <p:sldSz cx="12192000" cy="6858000"/>
   <p:notesSz cx="6858000" cy="9144000"/>
@@ -1100,7 +1101,7 @@
         <a:lstStyle/>
         <a:p>
           <a:r>
-            <a:rPr lang="en-US"/>
+            <a:rPr lang="en-US" dirty="0"/>
             <a:t>How does BMI affect medical billed by insurance?</a:t>
           </a:r>
         </a:p>
@@ -1136,7 +1137,7 @@
         <a:lstStyle/>
         <a:p>
           <a:r>
-            <a:rPr lang="en-US"/>
+            <a:rPr lang="en-US" dirty="0"/>
             <a:t>How does region of residency and being a (non)smoker affect medical bill?</a:t>
           </a:r>
         </a:p>
@@ -1172,7 +1173,7 @@
         <a:lstStyle/>
         <a:p>
           <a:r>
-            <a:rPr lang="en-US"/>
+            <a:rPr lang="en-US" dirty="0"/>
             <a:t>How does having children (0)(1-2)(3-5) affect insurance bill?</a:t>
           </a:r>
         </a:p>
@@ -1233,7 +1234,7 @@
       <dgm:spPr/>
     </dgm:pt>
     <dgm:pt modelId="{F2F61104-36C1-4D30-A329-A0D702BB13D4}" type="pres">
-      <dgm:prSet presAssocID="{E3163495-877A-49DA-A828-FE3AEE5B94CB}" presName="FourNodes_3" presStyleLbl="node1" presStyleIdx="2" presStyleCnt="4">
+      <dgm:prSet presAssocID="{E3163495-877A-49DA-A828-FE3AEE5B94CB}" presName="FourNodes_3" presStyleLbl="node1" presStyleIdx="2" presStyleCnt="4" custLinFactY="14225" custLinFactNeighborX="8375" custLinFactNeighborY="100000">
         <dgm:presLayoutVars>
           <dgm:bulletEnabled val="1"/>
         </dgm:presLayoutVars>
@@ -1241,7 +1242,7 @@
       <dgm:spPr/>
     </dgm:pt>
     <dgm:pt modelId="{E7367BD3-4443-4965-A81D-D70E57AC9DE9}" type="pres">
-      <dgm:prSet presAssocID="{E3163495-877A-49DA-A828-FE3AEE5B94CB}" presName="FourNodes_4" presStyleLbl="node1" presStyleIdx="3" presStyleCnt="4">
+      <dgm:prSet presAssocID="{E3163495-877A-49DA-A828-FE3AEE5B94CB}" presName="FourNodes_4" presStyleLbl="node1" presStyleIdx="3" presStyleCnt="4" custLinFactY="-22672" custLinFactNeighborX="-6661" custLinFactNeighborY="-100000">
         <dgm:presLayoutVars>
           <dgm:bulletEnabled val="1"/>
         </dgm:presLayoutVars>
@@ -1503,7 +1504,7 @@
             <a:buNone/>
           </a:pPr>
           <a:r>
-            <a:rPr lang="en-US" sz="2300" kern="1200"/>
+            <a:rPr lang="en-US" sz="2300" kern="1200" dirty="0"/>
             <a:t>How does BMI affect medical billed by insurance?</a:t>
           </a:r>
         </a:p>
@@ -1520,7 +1521,7 @@
       </dsp:nvSpPr>
       <dsp:spPr>
         <a:xfrm>
-          <a:off x="1340061" y="2004314"/>
+          <a:off x="2015130" y="2972918"/>
           <a:ext cx="8060520" cy="847979"/>
         </a:xfrm>
         <a:prstGeom prst="roundRect">
@@ -1583,13 +1584,13 @@
             <a:buNone/>
           </a:pPr>
           <a:r>
-            <a:rPr lang="en-US" sz="2300" kern="1200"/>
+            <a:rPr lang="en-US" sz="2300" kern="1200" dirty="0"/>
             <a:t>How does region of residency and being a (non)smoker affect medical bill?</a:t>
           </a:r>
         </a:p>
       </dsp:txBody>
       <dsp:txXfrm>
-        <a:off x="1364897" y="2029150"/>
+        <a:off x="2039966" y="2997754"/>
         <a:ext cx="6794669" cy="798307"/>
       </dsp:txXfrm>
     </dsp:sp>
@@ -1600,7 +1601,7 @@
       </dsp:nvSpPr>
       <dsp:spPr>
         <a:xfrm>
-          <a:off x="2015130" y="3006470"/>
+          <a:off x="1478218" y="1966238"/>
           <a:ext cx="8060520" cy="847979"/>
         </a:xfrm>
         <a:prstGeom prst="roundRect">
@@ -1663,13 +1664,13 @@
             <a:buNone/>
           </a:pPr>
           <a:r>
-            <a:rPr lang="en-US" sz="2300" kern="1200"/>
+            <a:rPr lang="en-US" sz="2300" kern="1200" dirty="0"/>
             <a:t>How does having children (0)(1-2)(3-5) affect insurance bill?</a:t>
           </a:r>
         </a:p>
       </dsp:txBody>
       <dsp:txXfrm>
-        <a:off x="2039966" y="3031306"/>
+        <a:off x="1503054" y="1991074"/>
         <a:ext cx="6784593" cy="798307"/>
       </dsp:txXfrm>
     </dsp:sp>
@@ -8370,6 +8371,141 @@
           <a:chExt cx="0" cy="0"/>
         </a:xfrm>
       </p:grpSpPr>
+      <p:sp>
+        <p:nvSpPr>
+          <p:cNvPr id="2" name="Title 1">
+            <a:extLst>
+              <a:ext uri="{FF2B5EF4-FFF2-40B4-BE49-F238E27FC236}">
+                <a16:creationId xmlns:a16="http://schemas.microsoft.com/office/drawing/2014/main" id="{FBA16AE9-5978-34DE-9AA4-2525DE3468AB}"/>
+              </a:ext>
+            </a:extLst>
+          </p:cNvPr>
+          <p:cNvSpPr>
+            <a:spLocks noGrp="1"/>
+          </p:cNvSpPr>
+          <p:nvPr>
+            <p:ph type="title"/>
+          </p:nvPr>
+        </p:nvSpPr>
+        <p:spPr>
+          <a:xfrm>
+            <a:off x="6705439" y="471101"/>
+            <a:ext cx="4569755" cy="1911741"/>
+          </a:xfrm>
+        </p:spPr>
+        <p:txBody>
+          <a:bodyPr>
+            <a:normAutofit/>
+          </a:bodyPr>
+          <a:lstStyle/>
+          <a:p>
+            <a:pPr algn="r">
+              <a:lnSpc>
+                <a:spcPct val="110000"/>
+              </a:lnSpc>
+            </a:pPr>
+            <a:r>
+              <a:rPr lang="en-US" sz="3700" dirty="0"/>
+              <a:t>How does number of children affect medical cost?</a:t>
+            </a:r>
+          </a:p>
+        </p:txBody>
+      </p:sp>
+      <p:pic>
+        <p:nvPicPr>
+          <p:cNvPr id="4" name="Content Placeholder 3" descr="A graph of blue rectangular bars&#10;&#10;Description automatically generated">
+            <a:extLst>
+              <a:ext uri="{FF2B5EF4-FFF2-40B4-BE49-F238E27FC236}">
+                <a16:creationId xmlns:a16="http://schemas.microsoft.com/office/drawing/2014/main" id="{05F8B313-8262-FBA5-C17B-A13F791202E1}"/>
+              </a:ext>
+            </a:extLst>
+          </p:cNvPr>
+          <p:cNvPicPr>
+            <a:picLocks noChangeAspect="1"/>
+          </p:cNvPicPr>
+          <p:nvPr/>
+        </p:nvPicPr>
+        <p:blipFill>
+          <a:blip r:embed="rId2"/>
+          <a:stretch>
+            <a:fillRect/>
+          </a:stretch>
+        </p:blipFill>
+        <p:spPr>
+          <a:xfrm>
+            <a:off x="757404" y="1751607"/>
+            <a:ext cx="6146743" cy="4732991"/>
+          </a:xfrm>
+          <a:prstGeom prst="rect">
+            <a:avLst/>
+          </a:prstGeom>
+        </p:spPr>
+      </p:pic>
+      <p:sp>
+        <p:nvSpPr>
+          <p:cNvPr id="8" name="Content Placeholder 7">
+            <a:extLst>
+              <a:ext uri="{FF2B5EF4-FFF2-40B4-BE49-F238E27FC236}">
+                <a16:creationId xmlns:a16="http://schemas.microsoft.com/office/drawing/2014/main" id="{63538DCD-9A0D-40E2-12E1-A5641C2503DB}"/>
+              </a:ext>
+            </a:extLst>
+          </p:cNvPr>
+          <p:cNvSpPr>
+            <a:spLocks noGrp="1"/>
+          </p:cNvSpPr>
+          <p:nvPr>
+            <p:ph idx="1"/>
+          </p:nvPr>
+        </p:nvSpPr>
+        <p:spPr>
+          <a:xfrm>
+            <a:off x="7308072" y="3354555"/>
+            <a:ext cx="3764655" cy="3215683"/>
+          </a:xfrm>
+        </p:spPr>
+        <p:txBody>
+          <a:bodyPr>
+            <a:normAutofit/>
+          </a:bodyPr>
+          <a:lstStyle/>
+          <a:p>
+            <a:r>
+              <a:rPr lang="en-US" dirty="0"/>
+              <a:t>In this bar chart we see that people who have no children pay an average of $12,365, 1-2 children $13,727 and 3 or more children pay an average of $14,576 after insurance. </a:t>
+            </a:r>
+          </a:p>
+        </p:txBody>
+      </p:sp>
+    </p:spTree>
+    <p:extLst>
+      <p:ext uri="{BB962C8B-B14F-4D97-AF65-F5344CB8AC3E}">
+        <p14:creationId xmlns:p14="http://schemas.microsoft.com/office/powerpoint/2010/main" val="1734367357"/>
+      </p:ext>
+    </p:extLst>
+  </p:cSld>
+  <p:clrMapOvr>
+    <a:masterClrMapping/>
+  </p:clrMapOvr>
+</p:sld>
+</file>
+
+<file path=ppt/slides/slide11.xml><?xml version="1.0" encoding="utf-8"?>
+<p:sld xmlns:a="http://schemas.openxmlformats.org/drawingml/2006/main" xmlns:r="http://schemas.openxmlformats.org/officeDocument/2006/relationships" xmlns:p="http://schemas.openxmlformats.org/presentationml/2006/main">
+  <p:cSld>
+    <p:spTree>
+      <p:nvGrpSpPr>
+        <p:cNvPr id="1" name=""/>
+        <p:cNvGrpSpPr/>
+        <p:nvPr/>
+      </p:nvGrpSpPr>
+      <p:grpSpPr>
+        <a:xfrm>
+          <a:off x="0" y="0"/>
+          <a:ext cx="0" cy="0"/>
+          <a:chOff x="0" y="0"/>
+          <a:chExt cx="0" cy="0"/>
+        </a:xfrm>
+      </p:grpSpPr>
       <p:pic>
         <p:nvPicPr>
           <p:cNvPr id="4" name="Content Placeholder 3">
@@ -8416,8 +8552,8 @@
         </p:nvSpPr>
         <p:spPr>
           <a:xfrm>
-            <a:off x="575815" y="1007042"/>
-            <a:ext cx="3601549" cy="1323439"/>
+            <a:off x="575815" y="2114390"/>
+            <a:ext cx="3601549" cy="1077218"/>
           </a:xfrm>
           <a:prstGeom prst="rect">
             <a:avLst/>
@@ -8432,7 +8568,7 @@
           <a:p>
             <a:r>
               <a:rPr lang="en-US" sz="1600" dirty="0"/>
-              <a:t>Here we have a scatterplot that shows a trend that looks like people with no children tend to have bigger medical charges. </a:t>
+              <a:t>Here we have a scatterplot that shows that people with no children tend to have higher medical charges. </a:t>
             </a:r>
           </a:p>
         </p:txBody>
@@ -8451,8 +8587,8 @@
         </p:nvSpPr>
         <p:spPr>
           <a:xfrm>
-            <a:off x="575815" y="2878860"/>
-            <a:ext cx="3282215" cy="830997"/>
+            <a:off x="575815" y="3986208"/>
+            <a:ext cx="3282215" cy="1323439"/>
           </a:xfrm>
           <a:prstGeom prst="rect">
             <a:avLst/>
@@ -8467,42 +8603,7 @@
           <a:p>
             <a:r>
               <a:rPr lang="en-US" sz="1600" dirty="0"/>
-              <a:t>We can see there are a few outliers in this information.</a:t>
-            </a:r>
-          </a:p>
-        </p:txBody>
-      </p:sp>
-      <p:sp>
-        <p:nvSpPr>
-          <p:cNvPr id="2" name="TextBox 1">
-            <a:extLst>
-              <a:ext uri="{FF2B5EF4-FFF2-40B4-BE49-F238E27FC236}">
-                <a16:creationId xmlns:a16="http://schemas.microsoft.com/office/drawing/2014/main" id="{6C791019-6E7C-92B0-2B72-EF3949CB5109}"/>
-              </a:ext>
-            </a:extLst>
-          </p:cNvPr>
-          <p:cNvSpPr txBox="1"/>
-          <p:nvPr/>
-        </p:nvSpPr>
-        <p:spPr>
-          <a:xfrm>
-            <a:off x="575815" y="4258236"/>
-            <a:ext cx="3325940" cy="1077218"/>
-          </a:xfrm>
-          <a:prstGeom prst="rect">
-            <a:avLst/>
-          </a:prstGeom>
-          <a:noFill/>
-        </p:spPr>
-        <p:txBody>
-          <a:bodyPr wrap="square" rtlCol="0">
-            <a:spAutoFit/>
-          </a:bodyPr>
-          <a:lstStyle/>
-          <a:p>
-            <a:r>
-              <a:rPr lang="en-US" sz="1600" dirty="0"/>
-              <a:t>Looking at this data, individuals with more children have a lower maximum medical charge</a:t>
+              <a:t>We can see there are a few outliers in this information that could affect the average charges that were calculated.</a:t>
             </a:r>
           </a:p>
         </p:txBody>
@@ -8520,7 +8621,7 @@
 </p:sld>
 </file>
 
-<file path=ppt/slides/slide11.xml><?xml version="1.0" encoding="utf-8"?>
+<file path=ppt/slides/slide12.xml><?xml version="1.0" encoding="utf-8"?>
 <p:sld xmlns:a="http://schemas.openxmlformats.org/drawingml/2006/main" xmlns:r="http://schemas.openxmlformats.org/officeDocument/2006/relationships" xmlns:p="http://schemas.openxmlformats.org/presentationml/2006/main">
   <p:cSld>
     <p:spTree>
@@ -8697,7 +8798,7 @@
 </p:sld>
 </file>
 
-<file path=ppt/slides/slide12.xml><?xml version="1.0" encoding="utf-8"?>
+<file path=ppt/slides/slide13.xml><?xml version="1.0" encoding="utf-8"?>
 <p:sld xmlns:a="http://schemas.openxmlformats.org/drawingml/2006/main" xmlns:r="http://schemas.openxmlformats.org/officeDocument/2006/relationships" xmlns:p="http://schemas.openxmlformats.org/presentationml/2006/main">
   <p:cSld>
     <p:spTree>
@@ -9381,7 +9482,7 @@
             <p:ph idx="1"/>
             <p:extLst>
               <p:ext uri="{D42A27DB-BD31-4B8C-83A1-F6EECF244321}">
-                <p14:modId xmlns:p14="http://schemas.microsoft.com/office/powerpoint/2010/main" val="2821318974"/>
+                <p14:modId xmlns:p14="http://schemas.microsoft.com/office/powerpoint/2010/main" val="1568712703"/>
               </p:ext>
             </p:extLst>
           </p:nvPr>
@@ -9995,7 +10096,7 @@
       </p:sp>
       <p:pic>
         <p:nvPicPr>
-          <p:cNvPr id="4" name="Content Placeholder 3" descr="A graph of blue rectangular bars&#10;&#10;Description automatically generated">
+          <p:cNvPr id="4" name="Content Placeholder 3">
             <a:extLst>
               <a:ext uri="{FF2B5EF4-FFF2-40B4-BE49-F238E27FC236}">
                 <a16:creationId xmlns:a16="http://schemas.microsoft.com/office/drawing/2014/main" id="{05F8B313-8262-FBA5-C17B-A13F791202E1}"/>
@@ -10008,15 +10109,20 @@
           <p:nvPr/>
         </p:nvPicPr>
         <p:blipFill>
-          <a:blip r:embed="rId2"/>
-          <a:stretch>
-            <a:fillRect/>
-          </a:stretch>
+          <a:blip r:embed="rId2">
+            <a:extLst>
+              <a:ext uri="{28A0092B-C50C-407E-A947-70E740481C1C}">
+                <a14:useLocalDpi xmlns:a14="http://schemas.microsoft.com/office/drawing/2010/main" val="0"/>
+              </a:ext>
+            </a:extLst>
+          </a:blip>
+          <a:srcRect/>
+          <a:stretch/>
         </p:blipFill>
         <p:spPr>
           <a:xfrm>
-            <a:off x="757404" y="1751607"/>
-            <a:ext cx="6146743" cy="4732991"/>
+            <a:off x="847842" y="1751607"/>
+            <a:ext cx="5965867" cy="4732991"/>
           </a:xfrm>
           <a:prstGeom prst="rect">
             <a:avLst/>
@@ -10025,10 +10131,10 @@
       </p:pic>
       <p:sp>
         <p:nvSpPr>
-          <p:cNvPr id="8" name="Content Placeholder 7">
-            <a:extLst>
-              <a:ext uri="{FF2B5EF4-FFF2-40B4-BE49-F238E27FC236}">
-                <a16:creationId xmlns:a16="http://schemas.microsoft.com/office/drawing/2014/main" id="{63538DCD-9A0D-40E2-12E1-A5641C2503DB}"/>
+          <p:cNvPr id="6" name="Content Placeholder 7">
+            <a:extLst>
+              <a:ext uri="{FF2B5EF4-FFF2-40B4-BE49-F238E27FC236}">
+                <a16:creationId xmlns:a16="http://schemas.microsoft.com/office/drawing/2014/main" id="{6177BF5A-BB66-38F0-96EE-833CA4921AF4}"/>
               </a:ext>
             </a:extLst>
           </p:cNvPr>
@@ -10041,7 +10147,7 @@
         </p:nvSpPr>
         <p:spPr>
           <a:xfrm>
-            <a:off x="7308072" y="3966952"/>
+            <a:off x="7308072" y="3354555"/>
             <a:ext cx="3764655" cy="3215683"/>
           </a:xfrm>
         </p:spPr>
@@ -10053,7 +10159,7 @@
           <a:p>
             <a:r>
               <a:rPr lang="en-US" dirty="0"/>
-              <a:t>In this bar chart we see that people who have no children pay an average of $12,365, 1-2 children $13,727 and 3 or more children pay an average of $14,576 after insurance. </a:t>
+              <a:t>In this histogram of the distribution of the number of children, we can see that three quarters of those survived have 0 to 2 children.</a:t>
             </a:r>
           </a:p>
         </p:txBody>

</xml_diff>